<commit_message>
Update Transit Gateway Blueprint 2_0.pptx
</commit_message>
<xml_diff>
--- a/Transit Gateway Blueprint 2_0.pptx
+++ b/Transit Gateway Blueprint 2_0.pptx
@@ -198,7 +198,7 @@
           <a:p>
             <a:fld id="{83E37768-ED53-4CC6-94EE-0D89F36C8C35}" type="datetimeFigureOut">
               <a:rPr lang="en-AU" smtClean="0"/>
-              <a:t>27/03/2020</a:t>
+              <a:t>31/03/2020</a:t>
             </a:fld>
             <a:endParaRPr lang="en-AU"/>
           </a:p>
@@ -861,7 +861,7 @@
           <a:p>
             <a:fld id="{285138E8-3F3E-4DC5-A5FA-50868B94627A}" type="datetimeFigureOut">
               <a:rPr lang="en-US" smtClean="0"/>
-              <a:t>27-Mar-20</a:t>
+              <a:t>31-Mar-20</a:t>
             </a:fld>
             <a:endParaRPr lang="en-US" dirty="0"/>
           </a:p>
@@ -1445,7 +1445,7 @@
           <a:p>
             <a:fld id="{00C1096B-9679-429B-9328-0AF82824D437}" type="datetimeFigureOut">
               <a:rPr lang="en-US" smtClean="0"/>
-              <a:t>27-Mar-20</a:t>
+              <a:t>31-Mar-20</a:t>
             </a:fld>
             <a:endParaRPr lang="en-US" dirty="0"/>
           </a:p>
@@ -1679,7 +1679,7 @@
           <a:p>
             <a:fld id="{285138E8-3F3E-4DC5-A5FA-50868B94627A}" type="datetimeFigureOut">
               <a:rPr lang="en-US" smtClean="0"/>
-              <a:t>27-Mar-20</a:t>
+              <a:t>31-Mar-20</a:t>
             </a:fld>
             <a:endParaRPr lang="en-US" dirty="0"/>
           </a:p>
@@ -1949,7 +1949,7 @@
           <a:p>
             <a:fld id="{285138E8-3F3E-4DC5-A5FA-50868B94627A}" type="datetimeFigureOut">
               <a:rPr lang="en-US" smtClean="0"/>
-              <a:t>27-Mar-20</a:t>
+              <a:t>31-Mar-20</a:t>
             </a:fld>
             <a:endParaRPr lang="en-US" dirty="0"/>
           </a:p>
@@ -2141,7 +2141,7 @@
           <a:p>
             <a:fld id="{1C396E99-728E-4BC1-9827-5FA2D157E6FB}" type="datetimeFigureOut">
               <a:rPr lang="en-US" smtClean="0"/>
-              <a:t>27-Mar-20</a:t>
+              <a:t>31-Mar-20</a:t>
             </a:fld>
             <a:endParaRPr lang="en-US" dirty="0"/>
           </a:p>
@@ -2306,7 +2306,7 @@
           <a:p>
             <a:fld id="{285138E8-3F3E-4DC5-A5FA-50868B94627A}" type="datetimeFigureOut">
               <a:rPr lang="en-US" smtClean="0"/>
-              <a:t>27-Mar-20</a:t>
+              <a:t>31-Mar-20</a:t>
             </a:fld>
             <a:endParaRPr lang="en-US" dirty="0"/>
           </a:p>
@@ -2707,7 +2707,7 @@
           <a:p>
             <a:fld id="{285138E8-3F3E-4DC5-A5FA-50868B94627A}" type="datetimeFigureOut">
               <a:rPr lang="en-US" smtClean="0"/>
-              <a:t>27-Mar-20</a:t>
+              <a:t>31-Mar-20</a:t>
             </a:fld>
             <a:endParaRPr lang="en-US" dirty="0"/>
           </a:p>
@@ -3407,7 +3407,7 @@
           <a:p>
             <a:fld id="{1C396E99-728E-4BC1-9827-5FA2D157E6FB}" type="datetimeFigureOut">
               <a:rPr lang="en-US" smtClean="0"/>
-              <a:t>27-Mar-20</a:t>
+              <a:t>31-Mar-20</a:t>
             </a:fld>
             <a:endParaRPr lang="en-US" dirty="0"/>
           </a:p>
@@ -3530,7 +3530,7 @@
           <a:p>
             <a:fld id="{285138E8-3F3E-4DC5-A5FA-50868B94627A}" type="datetimeFigureOut">
               <a:rPr lang="en-US" smtClean="0"/>
-              <a:t>27-Mar-20</a:t>
+              <a:t>31-Mar-20</a:t>
             </a:fld>
             <a:endParaRPr lang="en-US" dirty="0"/>
           </a:p>
@@ -3861,7 +3861,7 @@
           <a:p>
             <a:fld id="{631CED19-27F7-4D05-847C-E59ED2A84874}" type="datetimeFigureOut">
               <a:rPr lang="en-US" smtClean="0"/>
-              <a:t>27-Mar-20</a:t>
+              <a:t>31-Mar-20</a:t>
             </a:fld>
             <a:endParaRPr lang="en-US" dirty="0"/>
           </a:p>
@@ -4674,7 +4674,7 @@
           <a:p>
             <a:fld id="{285138E8-3F3E-4DC5-A5FA-50868B94627A}" type="datetimeFigureOut">
               <a:rPr lang="en-US" smtClean="0"/>
-              <a:t>27-Mar-20</a:t>
+              <a:t>31-Mar-20</a:t>
             </a:fld>
             <a:endParaRPr lang="en-US" dirty="0"/>
           </a:p>
@@ -5817,18 +5817,7 @@
                           <a:ea typeface="+mn-ea"/>
                           <a:cs typeface="+mn-cs"/>
                         </a:rPr>
-                        <a:t>Active GW </a:t>
-                      </a:r>
-                      <a:r>
-                        <a:rPr lang="en-US" sz="1200" kern="1200" dirty="0" smtClean="0">
-                          <a:solidFill>
-                            <a:schemeClr val="dk1"/>
-                          </a:solidFill>
-                          <a:latin typeface="+mn-lt"/>
-                          <a:ea typeface="+mn-ea"/>
-                          <a:cs typeface="+mn-cs"/>
-                        </a:rPr>
-                        <a:t>ENI</a:t>
+                        <a:t>Active GW ENI</a:t>
                       </a:r>
                     </a:p>
                     <a:p>
@@ -6128,18 +6117,7 @@
                           <a:ea typeface="+mn-ea"/>
                           <a:cs typeface="+mn-cs"/>
                         </a:rPr>
-                        <a:t>Active GW </a:t>
-                      </a:r>
-                      <a:r>
-                        <a:rPr lang="en-US" sz="1200" kern="1200" dirty="0" smtClean="0">
-                          <a:solidFill>
-                            <a:schemeClr val="dk1"/>
-                          </a:solidFill>
-                          <a:latin typeface="+mn-lt"/>
-                          <a:ea typeface="+mn-ea"/>
-                          <a:cs typeface="+mn-cs"/>
-                        </a:rPr>
-                        <a:t>ENI eth1 internal</a:t>
+                        <a:t>Active GW ENI eth1 internal</a:t>
                       </a:r>
                       <a:endParaRPr lang="en-US" sz="1200" kern="1200" dirty="0">
                         <a:solidFill>
@@ -10267,18 +10245,18 @@
           <a:lstStyle/>
           <a:p>
             <a:r>
-              <a:rPr lang="en-US" dirty="0" smtClean="0"/>
+              <a:rPr lang="en-US" sz="2000" dirty="0" smtClean="0"/>
               <a:t>TGW Attachments </a:t>
             </a:r>
           </a:p>
           <a:p>
             <a:pPr lvl="1"/>
             <a:r>
-              <a:rPr lang="en-US" dirty="0" smtClean="0"/>
+              <a:rPr lang="en-US" sz="1800" dirty="0" smtClean="0"/>
               <a:t>Security VPC </a:t>
             </a:r>
             <a:r>
-              <a:rPr lang="en-US" dirty="0" smtClean="0">
+              <a:rPr lang="en-US" sz="1800" dirty="0" smtClean="0">
                 <a:sym typeface="Wingdings" panose="05000000000000000000" pitchFamily="2" charset="2"/>
               </a:rPr>
               <a:t> TGW subnet</a:t>
@@ -10287,7 +10265,7 @@
           <a:p>
             <a:pPr lvl="1"/>
             <a:r>
-              <a:rPr lang="en-US" dirty="0" smtClean="0">
+              <a:rPr lang="en-US" sz="1800" dirty="0" smtClean="0">
                 <a:sym typeface="Wingdings" panose="05000000000000000000" pitchFamily="2" charset="2"/>
               </a:rPr>
               <a:t>Spoke1  Spoke1 external subnet</a:t>
@@ -10296,7 +10274,7 @@
           <a:p>
             <a:pPr lvl="1"/>
             <a:r>
-              <a:rPr lang="en-US" dirty="0" smtClean="0">
+              <a:rPr lang="en-US" sz="1800" dirty="0" smtClean="0">
                 <a:sym typeface="Wingdings" panose="05000000000000000000" pitchFamily="2" charset="2"/>
               </a:rPr>
               <a:t>Spoke2  Spoke2 external subnet</a:t>
@@ -10304,7 +10282,7 @@
           </a:p>
           <a:p>
             <a:r>
-              <a:rPr lang="en-US" dirty="0" smtClean="0">
+              <a:rPr lang="en-US" sz="2000" dirty="0" smtClean="0">
                 <a:sym typeface="Wingdings" panose="05000000000000000000" pitchFamily="2" charset="2"/>
               </a:rPr>
               <a:t>TGW Route Tables </a:t>
@@ -10313,7 +10291,7 @@
           <a:p>
             <a:pPr lvl="1"/>
             <a:r>
-              <a:rPr lang="en-US" dirty="0" smtClean="0">
+              <a:rPr lang="en-US" sz="1800" dirty="0" smtClean="0">
                 <a:sym typeface="Wingdings" panose="05000000000000000000" pitchFamily="2" charset="2"/>
               </a:rPr>
               <a:t>Spoke Route Table, associated to Spoke1 and Spoke2 attachment,  default route</a:t>
@@ -10322,43 +10300,43 @@
           <a:p>
             <a:pPr lvl="1"/>
             <a:r>
-              <a:rPr lang="en-US" dirty="0" smtClean="0">
+              <a:rPr lang="en-US" sz="1800" dirty="0" smtClean="0">
                 <a:sym typeface="Wingdings" panose="05000000000000000000" pitchFamily="2" charset="2"/>
               </a:rPr>
               <a:t>CP Route </a:t>
             </a:r>
             <a:r>
-              <a:rPr lang="en-US" dirty="0">
+              <a:rPr lang="en-US" sz="1800" dirty="0">
                 <a:sym typeface="Wingdings" panose="05000000000000000000" pitchFamily="2" charset="2"/>
               </a:rPr>
               <a:t>Table, associated to </a:t>
             </a:r>
             <a:r>
-              <a:rPr lang="en-US" dirty="0" smtClean="0">
+              <a:rPr lang="en-US" sz="1800" dirty="0" smtClean="0">
                 <a:sym typeface="Wingdings" panose="05000000000000000000" pitchFamily="2" charset="2"/>
               </a:rPr>
               <a:t>security </a:t>
             </a:r>
             <a:r>
-              <a:rPr lang="en-US" dirty="0">
+              <a:rPr lang="en-US" sz="1800" dirty="0">
                 <a:sym typeface="Wingdings" panose="05000000000000000000" pitchFamily="2" charset="2"/>
               </a:rPr>
               <a:t>attachment,  </a:t>
             </a:r>
             <a:r>
-              <a:rPr lang="en-US" dirty="0" smtClean="0">
+              <a:rPr lang="en-US" sz="1800" dirty="0" smtClean="0">
                 <a:sym typeface="Wingdings" panose="05000000000000000000" pitchFamily="2" charset="2"/>
               </a:rPr>
               <a:t>propagated to </a:t>
             </a:r>
             <a:r>
-              <a:rPr lang="en-US" dirty="0">
+              <a:rPr lang="en-US" sz="1800" dirty="0">
                 <a:sym typeface="Wingdings" panose="05000000000000000000" pitchFamily="2" charset="2"/>
               </a:rPr>
               <a:t>Spoke1 and Spoke2 </a:t>
             </a:r>
             <a:r>
-              <a:rPr lang="en-US" dirty="0" smtClean="0">
+              <a:rPr lang="en-US" sz="1800" dirty="0" smtClean="0">
                 <a:sym typeface="Wingdings" panose="05000000000000000000" pitchFamily="2" charset="2"/>
               </a:rPr>
               <a:t>attachment, propagated routes</a:t>

</xml_diff>